<commit_message>
Final tweaks from A2 R User Group meeting presentation
</commit_message>
<xml_diff>
--- a/talk.pptx
+++ b/talk.pptx
@@ -3991,6 +3991,13 @@
   <p:clrMapOvr>
     <a:masterClrMapping/>
   </p:clrMapOvr>
+  <p:timing>
+    <p:tnLst>
+      <p:par>
+        <p:cTn xmlns:p14="http://schemas.microsoft.com/office/powerpoint/2010/main" id="1" dur="indefinite" restart="never" nodeType="tmRoot"/>
+      </p:par>
+    </p:tnLst>
+  </p:timing>
 </p:sld>
 </file>
 
@@ -7082,6 +7089,13 @@
   <p:clrMapOvr>
     <a:masterClrMapping/>
   </p:clrMapOvr>
+  <p:timing>
+    <p:tnLst>
+      <p:par>
+        <p:cTn xmlns:p14="http://schemas.microsoft.com/office/powerpoint/2010/main" id="1" dur="indefinite" restart="never" nodeType="tmRoot"/>
+      </p:par>
+    </p:tnLst>
+  </p:timing>
 </p:sld>
 </file>
 
@@ -8182,6 +8196,13 @@
   <p:clrMapOvr>
     <a:masterClrMapping/>
   </p:clrMapOvr>
+  <p:timing>
+    <p:tnLst>
+      <p:par>
+        <p:cTn xmlns:p14="http://schemas.microsoft.com/office/powerpoint/2010/main" id="1" dur="indefinite" restart="never" nodeType="tmRoot"/>
+      </p:par>
+    </p:tnLst>
+  </p:timing>
 </p:sld>
 </file>
 
@@ -8348,6 +8369,13 @@
   <p:clrMapOvr>
     <a:masterClrMapping/>
   </p:clrMapOvr>
+  <p:timing>
+    <p:tnLst>
+      <p:par>
+        <p:cTn xmlns:p14="http://schemas.microsoft.com/office/powerpoint/2010/main" id="1" dur="indefinite" restart="never" nodeType="tmRoot"/>
+      </p:par>
+    </p:tnLst>
+  </p:timing>
 </p:sld>
 </file>
 
@@ -8436,6 +8464,13 @@
   <p:clrMapOvr>
     <a:masterClrMapping/>
   </p:clrMapOvr>
+  <p:timing>
+    <p:tnLst>
+      <p:par>
+        <p:cTn xmlns:p14="http://schemas.microsoft.com/office/powerpoint/2010/main" id="1" dur="indefinite" restart="never" nodeType="tmRoot"/>
+      </p:par>
+    </p:tnLst>
+  </p:timing>
 </p:sld>
 </file>
 

</xml_diff>